<commit_message>
Update Presentation.pptx with latest changes
</commit_message>
<xml_diff>
--- a/Presentation.pptx
+++ b/Presentation.pptx
@@ -14,8 +14,9 @@
     <p:sldId id="287" r:id="rId8"/>
     <p:sldId id="288" r:id="rId9"/>
     <p:sldId id="289" r:id="rId10"/>
-    <p:sldId id="290" r:id="rId11"/>
-    <p:sldId id="260" r:id="rId12"/>
+    <p:sldId id="291" r:id="rId11"/>
+    <p:sldId id="290" r:id="rId12"/>
+    <p:sldId id="260" r:id="rId13"/>
   </p:sldIdLst>
   <p:sldSz cx="12192000" cy="6858000"/>
   <p:notesSz cx="6858000" cy="9144000"/>
@@ -264,7 +265,7 @@
           <a:p>
             <a:fld id="{9A054462-01F3-40E7-8D89-0F5692D47E1B}" type="datetimeFigureOut">
               <a:rPr lang="en-US" smtClean="0"/>
-              <a:t>7/9/2025</a:t>
+              <a:t>7/10/2025</a:t>
             </a:fld>
             <a:endParaRPr lang="en-US"/>
           </a:p>
@@ -429,7 +430,7 @@
           <a:p>
             <a:fld id="{9A054462-01F3-40E7-8D89-0F5692D47E1B}" type="datetimeFigureOut">
               <a:rPr lang="en-US" smtClean="0"/>
-              <a:t>7/9/2025</a:t>
+              <a:t>7/10/2025</a:t>
             </a:fld>
             <a:endParaRPr lang="en-US"/>
           </a:p>
@@ -604,7 +605,7 @@
           <a:p>
             <a:fld id="{9A054462-01F3-40E7-8D89-0F5692D47E1B}" type="datetimeFigureOut">
               <a:rPr lang="en-US" smtClean="0"/>
-              <a:t>7/9/2025</a:t>
+              <a:t>7/10/2025</a:t>
             </a:fld>
             <a:endParaRPr lang="en-US"/>
           </a:p>
@@ -769,7 +770,7 @@
           <a:p>
             <a:fld id="{9A054462-01F3-40E7-8D89-0F5692D47E1B}" type="datetimeFigureOut">
               <a:rPr lang="en-US" smtClean="0"/>
-              <a:t>7/9/2025</a:t>
+              <a:t>7/10/2025</a:t>
             </a:fld>
             <a:endParaRPr lang="en-US"/>
           </a:p>
@@ -1010,7 +1011,7 @@
           <a:p>
             <a:fld id="{9A054462-01F3-40E7-8D89-0F5692D47E1B}" type="datetimeFigureOut">
               <a:rPr lang="en-US" smtClean="0"/>
-              <a:t>7/9/2025</a:t>
+              <a:t>7/10/2025</a:t>
             </a:fld>
             <a:endParaRPr lang="en-US"/>
           </a:p>
@@ -1237,7 +1238,7 @@
           <a:p>
             <a:fld id="{9A054462-01F3-40E7-8D89-0F5692D47E1B}" type="datetimeFigureOut">
               <a:rPr lang="en-US" smtClean="0"/>
-              <a:t>7/9/2025</a:t>
+              <a:t>7/10/2025</a:t>
             </a:fld>
             <a:endParaRPr lang="en-US"/>
           </a:p>
@@ -1599,7 +1600,7 @@
           <a:p>
             <a:fld id="{9A054462-01F3-40E7-8D89-0F5692D47E1B}" type="datetimeFigureOut">
               <a:rPr lang="en-US" smtClean="0"/>
-              <a:t>7/9/2025</a:t>
+              <a:t>7/10/2025</a:t>
             </a:fld>
             <a:endParaRPr lang="en-US"/>
           </a:p>
@@ -1712,7 +1713,7 @@
           <a:p>
             <a:fld id="{9A054462-01F3-40E7-8D89-0F5692D47E1B}" type="datetimeFigureOut">
               <a:rPr lang="en-US" smtClean="0"/>
-              <a:t>7/9/2025</a:t>
+              <a:t>7/10/2025</a:t>
             </a:fld>
             <a:endParaRPr lang="en-US"/>
           </a:p>
@@ -1802,7 +1803,7 @@
           <a:p>
             <a:fld id="{9A054462-01F3-40E7-8D89-0F5692D47E1B}" type="datetimeFigureOut">
               <a:rPr lang="en-US" smtClean="0"/>
-              <a:t>7/9/2025</a:t>
+              <a:t>7/10/2025</a:t>
             </a:fld>
             <a:endParaRPr lang="en-US"/>
           </a:p>
@@ -2074,7 +2075,7 @@
           <a:p>
             <a:fld id="{9A054462-01F3-40E7-8D89-0F5692D47E1B}" type="datetimeFigureOut">
               <a:rPr lang="en-US" smtClean="0"/>
-              <a:t>7/9/2025</a:t>
+              <a:t>7/10/2025</a:t>
             </a:fld>
             <a:endParaRPr lang="en-US"/>
           </a:p>
@@ -2322,7 +2323,7 @@
           <a:p>
             <a:fld id="{9A054462-01F3-40E7-8D89-0F5692D47E1B}" type="datetimeFigureOut">
               <a:rPr lang="en-US" smtClean="0"/>
-              <a:t>7/9/2025</a:t>
+              <a:t>7/10/2025</a:t>
             </a:fld>
             <a:endParaRPr lang="en-US"/>
           </a:p>
@@ -2539,7 +2540,7 @@
           <a:p>
             <a:fld id="{9A054462-01F3-40E7-8D89-0F5692D47E1B}" type="datetimeFigureOut">
               <a:rPr lang="en-US" smtClean="0"/>
-              <a:t>7/9/2025</a:t>
+              <a:t>7/10/2025</a:t>
             </a:fld>
             <a:endParaRPr lang="en-US"/>
           </a:p>
@@ -3272,6 +3273,274 @@
                   </a:outerShdw>
                 </a:effectLst>
               </a:rPr>
+              <a:t>Preview</a:t>
+            </a:r>
+            <a:endParaRPr lang="en-US" sz="3000" b="1" dirty="0">
+              <a:ln w="0"/>
+              <a:solidFill>
+                <a:schemeClr val="bg1"/>
+              </a:solidFill>
+              <a:effectLst>
+                <a:outerShdw blurRad="38100" dist="19050" dir="2700000" algn="tl" rotWithShape="0">
+                  <a:schemeClr val="dk1">
+                    <a:alpha val="40000"/>
+                  </a:schemeClr>
+                </a:outerShdw>
+              </a:effectLst>
+            </a:endParaRPr>
+          </a:p>
+        </p:txBody>
+      </p:sp>
+      <p:sp>
+        <p:nvSpPr>
+          <p:cNvPr id="39" name="Rectangle 38"/>
+          <p:cNvSpPr/>
+          <p:nvPr/>
+        </p:nvSpPr>
+        <p:spPr>
+          <a:xfrm flipV="1">
+            <a:off x="4368801" y="1099783"/>
+            <a:ext cx="3155719" cy="45719"/>
+          </a:xfrm>
+          <a:prstGeom prst="rect">
+            <a:avLst/>
+          </a:prstGeom>
+        </p:spPr>
+        <p:style>
+          <a:lnRef idx="2">
+            <a:schemeClr val="accent1">
+              <a:shade val="50000"/>
+            </a:schemeClr>
+          </a:lnRef>
+          <a:fillRef idx="1">
+            <a:schemeClr val="accent1"/>
+          </a:fillRef>
+          <a:effectRef idx="0">
+            <a:schemeClr val="accent1"/>
+          </a:effectRef>
+          <a:fontRef idx="minor">
+            <a:schemeClr val="lt1"/>
+          </a:fontRef>
+        </p:style>
+        <p:txBody>
+          <a:bodyPr rtlCol="0" anchor="ctr"/>
+          <a:lstStyle/>
+          <a:p>
+            <a:pPr algn="ctr"/>
+            <a:endParaRPr lang="en-US"/>
+          </a:p>
+        </p:txBody>
+      </p:sp>
+      <p:sp>
+        <p:nvSpPr>
+          <p:cNvPr id="27" name="Rectangle 26"/>
+          <p:cNvSpPr/>
+          <p:nvPr/>
+        </p:nvSpPr>
+        <p:spPr>
+          <a:xfrm>
+            <a:off x="876187" y="1766375"/>
+            <a:ext cx="10357870" cy="430887"/>
+          </a:xfrm>
+          <a:prstGeom prst="rect">
+            <a:avLst/>
+          </a:prstGeom>
+          <a:noFill/>
+        </p:spPr>
+        <p:txBody>
+          <a:bodyPr wrap="square" lIns="91440" tIns="45720" rIns="91440" bIns="45720">
+            <a:spAutoFit/>
+          </a:bodyPr>
+          <a:lstStyle/>
+          <a:p>
+            <a:endParaRPr lang="en-US" sz="2200" cap="none" spc="0" dirty="0">
+              <a:ln w="0"/>
+              <a:solidFill>
+                <a:schemeClr val="bg1"/>
+              </a:solidFill>
+              <a:effectLst>
+                <a:outerShdw blurRad="38100" dist="19050" dir="2700000" algn="tl" rotWithShape="0">
+                  <a:schemeClr val="dk1">
+                    <a:alpha val="40000"/>
+                  </a:schemeClr>
+                </a:outerShdw>
+              </a:effectLst>
+            </a:endParaRPr>
+          </a:p>
+        </p:txBody>
+      </p:sp>
+      <p:pic>
+        <p:nvPicPr>
+          <p:cNvPr id="3" name="Picture 2"/>
+          <p:cNvPicPr>
+            <a:picLocks noChangeAspect="1"/>
+          </p:cNvPicPr>
+          <p:nvPr/>
+        </p:nvPicPr>
+        <p:blipFill>
+          <a:blip r:embed="rId2"/>
+          <a:stretch>
+            <a:fillRect/>
+          </a:stretch>
+        </p:blipFill>
+        <p:spPr>
+          <a:xfrm>
+            <a:off x="545421" y="1648744"/>
+            <a:ext cx="5550579" cy="3122963"/>
+          </a:xfrm>
+          <a:prstGeom prst="rect">
+            <a:avLst/>
+          </a:prstGeom>
+        </p:spPr>
+      </p:pic>
+      <p:pic>
+        <p:nvPicPr>
+          <p:cNvPr id="7" name="Picture 6"/>
+          <p:cNvPicPr>
+            <a:picLocks noChangeAspect="1"/>
+          </p:cNvPicPr>
+          <p:nvPr/>
+        </p:nvPicPr>
+        <p:blipFill>
+          <a:blip r:embed="rId3"/>
+          <a:stretch>
+            <a:fillRect/>
+          </a:stretch>
+        </p:blipFill>
+        <p:spPr>
+          <a:xfrm>
+            <a:off x="5334000" y="2613891"/>
+            <a:ext cx="6152363" cy="3459015"/>
+          </a:xfrm>
+          <a:prstGeom prst="rect">
+            <a:avLst/>
+          </a:prstGeom>
+        </p:spPr>
+      </p:pic>
+    </p:spTree>
+    <p:extLst>
+      <p:ext uri="{BB962C8B-B14F-4D97-AF65-F5344CB8AC3E}">
+        <p14:creationId xmlns:p14="http://schemas.microsoft.com/office/powerpoint/2010/main" val="1940901815"/>
+      </p:ext>
+    </p:extLst>
+  </p:cSld>
+  <p:clrMapOvr>
+    <a:masterClrMapping/>
+  </p:clrMapOvr>
+  <p:timing>
+    <p:tnLst>
+      <p:par>
+        <p:cTn id="1" dur="indefinite" restart="never" nodeType="tmRoot"/>
+      </p:par>
+    </p:tnLst>
+  </p:timing>
+</p:sld>
+</file>
+
+<file path=ppt/slides/slide11.xml><?xml version="1.0" encoding="utf-8"?>
+<p:sld xmlns:a="http://schemas.openxmlformats.org/drawingml/2006/main" xmlns:r="http://schemas.openxmlformats.org/officeDocument/2006/relationships" xmlns:p="http://schemas.openxmlformats.org/presentationml/2006/main">
+  <p:cSld>
+    <p:spTree>
+      <p:nvGrpSpPr>
+        <p:cNvPr id="1" name=""/>
+        <p:cNvGrpSpPr/>
+        <p:nvPr/>
+      </p:nvGrpSpPr>
+      <p:grpSpPr>
+        <a:xfrm>
+          <a:off x="0" y="0"/>
+          <a:ext cx="0" cy="0"/>
+          <a:chOff x="0" y="0"/>
+          <a:chExt cx="0" cy="0"/>
+        </a:xfrm>
+      </p:grpSpPr>
+      <p:sp>
+        <p:nvSpPr>
+          <p:cNvPr id="4" name="Rectangle 3"/>
+          <p:cNvSpPr/>
+          <p:nvPr/>
+        </p:nvSpPr>
+        <p:spPr>
+          <a:xfrm>
+            <a:off x="0" y="0"/>
+            <a:ext cx="12192000" cy="6858000"/>
+          </a:xfrm>
+          <a:prstGeom prst="rect">
+            <a:avLst/>
+          </a:prstGeom>
+          <a:solidFill>
+            <a:schemeClr val="tx1">
+              <a:lumMod val="85000"/>
+              <a:lumOff val="15000"/>
+              <a:alpha val="95000"/>
+            </a:schemeClr>
+          </a:solidFill>
+          <a:ln>
+            <a:noFill/>
+          </a:ln>
+        </p:spPr>
+        <p:style>
+          <a:lnRef idx="2">
+            <a:schemeClr val="accent1">
+              <a:shade val="50000"/>
+            </a:schemeClr>
+          </a:lnRef>
+          <a:fillRef idx="1">
+            <a:schemeClr val="accent1"/>
+          </a:fillRef>
+          <a:effectRef idx="0">
+            <a:schemeClr val="accent1"/>
+          </a:effectRef>
+          <a:fontRef idx="minor">
+            <a:schemeClr val="lt1"/>
+          </a:fontRef>
+        </p:style>
+        <p:txBody>
+          <a:bodyPr rtlCol="0" anchor="ctr"/>
+          <a:lstStyle/>
+          <a:p>
+            <a:pPr algn="ctr"/>
+            <a:endParaRPr lang="en-US" sz="7200" dirty="0"/>
+          </a:p>
+        </p:txBody>
+      </p:sp>
+      <p:sp>
+        <p:nvSpPr>
+          <p:cNvPr id="38" name="Rectangle 37"/>
+          <p:cNvSpPr/>
+          <p:nvPr/>
+        </p:nvSpPr>
+        <p:spPr>
+          <a:xfrm>
+            <a:off x="1762064" y="452592"/>
+            <a:ext cx="8586116" cy="553998"/>
+          </a:xfrm>
+          <a:prstGeom prst="rect">
+            <a:avLst/>
+          </a:prstGeom>
+          <a:noFill/>
+        </p:spPr>
+        <p:txBody>
+          <a:bodyPr wrap="square" lIns="91440" tIns="45720" rIns="91440" bIns="45720">
+            <a:spAutoFit/>
+          </a:bodyPr>
+          <a:lstStyle/>
+          <a:p>
+            <a:pPr algn="ctr"/>
+            <a:r>
+              <a:rPr lang="en-US" sz="3000" b="1" dirty="0" smtClean="0">
+                <a:ln w="0"/>
+                <a:solidFill>
+                  <a:schemeClr val="bg1"/>
+                </a:solidFill>
+                <a:effectLst>
+                  <a:outerShdw blurRad="38100" dist="19050" dir="2700000" algn="tl" rotWithShape="0">
+                    <a:schemeClr val="dk1">
+                      <a:alpha val="40000"/>
+                    </a:schemeClr>
+                  </a:outerShdw>
+                </a:effectLst>
+              </a:rPr>
               <a:t>Conclusion</a:t>
             </a:r>
             <a:endParaRPr lang="en-US" sz="3000" b="1" dirty="0">
@@ -3460,19 +3729,6 @@
                 </a:rPr>
                 <a:t>Achieved ~95% test accuracy.</a:t>
               </a:r>
-              <a:endParaRPr lang="en-US" sz="2400" b="1" dirty="0">
-                <a:ln w="0"/>
-                <a:solidFill>
-                  <a:schemeClr val="bg1"/>
-                </a:solidFill>
-                <a:effectLst>
-                  <a:outerShdw blurRad="38100" dist="19050" dir="2700000" algn="tl" rotWithShape="0">
-                    <a:schemeClr val="dk1">
-                      <a:alpha val="40000"/>
-                    </a:schemeClr>
-                  </a:outerShdw>
-                </a:effectLst>
-              </a:endParaRPr>
             </a:p>
           </p:txBody>
         </p:sp>
@@ -3569,19 +3825,6 @@
                 </a:rPr>
                 <a:t>Model supports early detection.</a:t>
               </a:r>
-              <a:endParaRPr lang="en-US" sz="2400" b="1" dirty="0">
-                <a:ln w="0"/>
-                <a:solidFill>
-                  <a:schemeClr val="bg1"/>
-                </a:solidFill>
-                <a:effectLst>
-                  <a:outerShdw blurRad="38100" dist="19050" dir="2700000" algn="tl" rotWithShape="0">
-                    <a:schemeClr val="dk1">
-                      <a:alpha val="40000"/>
-                    </a:schemeClr>
-                  </a:outerShdw>
-                </a:effectLst>
-              </a:endParaRPr>
             </a:p>
           </p:txBody>
         </p:sp>
@@ -3715,7 +3958,7 @@
 </p:sld>
 </file>
 
-<file path=ppt/slides/slide11.xml><?xml version="1.0" encoding="utf-8"?>
+<file path=ppt/slides/slide12.xml><?xml version="1.0" encoding="utf-8"?>
 <p:sld xmlns:a="http://schemas.openxmlformats.org/drawingml/2006/main" xmlns:r="http://schemas.openxmlformats.org/officeDocument/2006/relationships" xmlns:p="http://schemas.openxmlformats.org/presentationml/2006/main">
   <p:cSld>
     <p:spTree>
@@ -4215,23 +4458,7 @@
                       </a:outerShdw>
                     </a:effectLst>
                   </a:rPr>
-                  <a:t>: </a:t>
-                </a:r>
-                <a:r>
-                  <a:rPr lang="en-US" sz="2000" dirty="0" smtClean="0">
-                    <a:ln w="0"/>
-                    <a:solidFill>
-                      <a:schemeClr val="bg1"/>
-                    </a:solidFill>
-                    <a:effectLst>
-                      <a:outerShdw blurRad="38100" dist="19050" dir="2700000" algn="tl" rotWithShape="0">
-                        <a:schemeClr val="dk1">
-                          <a:alpha val="40000"/>
-                        </a:schemeClr>
-                      </a:outerShdw>
-                    </a:effectLst>
-                  </a:rPr>
-                  <a:t>8th</a:t>
+                  <a:t>: 8th</a:t>
                 </a:r>
                 <a:endParaRPr lang="en-US" sz="2000" cap="none" spc="0" dirty="0">
                   <a:ln w="0"/>
@@ -4762,23 +4989,7 @@
                   </a:outerShdw>
                 </a:effectLst>
               </a:rPr>
-              <a:t>Course Details &amp; Team </a:t>
-            </a:r>
-            <a:r>
-              <a:rPr lang="en-US" sz="3000" b="1" cap="none" spc="0" dirty="0" smtClean="0">
-                <a:ln w="0"/>
-                <a:solidFill>
-                  <a:schemeClr val="bg1"/>
-                </a:solidFill>
-                <a:effectLst>
-                  <a:outerShdw blurRad="38100" dist="19050" dir="2700000" algn="tl" rotWithShape="0">
-                    <a:schemeClr val="dk1">
-                      <a:alpha val="40000"/>
-                    </a:schemeClr>
-                  </a:outerShdw>
-                </a:effectLst>
-              </a:rPr>
-              <a:t>Members</a:t>
+              <a:t>Course Details &amp; Team Members</a:t>
             </a:r>
             <a:endParaRPr lang="en-US" sz="3000" b="1" cap="none" spc="0" dirty="0">
               <a:ln w="0"/>
@@ -5087,19 +5298,6 @@
               </a:rPr>
               <a:t>Problem Statement</a:t>
             </a:r>
-            <a:endParaRPr lang="en-US" sz="3000" b="1" dirty="0">
-              <a:ln w="0"/>
-              <a:solidFill>
-                <a:schemeClr val="bg1"/>
-              </a:solidFill>
-              <a:effectLst>
-                <a:outerShdw blurRad="38100" dist="19050" dir="2700000" algn="tl" rotWithShape="0">
-                  <a:schemeClr val="dk1">
-                    <a:alpha val="40000"/>
-                  </a:schemeClr>
-                </a:outerShdw>
-              </a:effectLst>
-            </a:endParaRPr>
           </a:p>
         </p:txBody>
       </p:sp>
@@ -5301,19 +5499,6 @@
                     </a:rPr>
                     <a:t>Brain Tumor = Serious health issue.</a:t>
                   </a:r>
-                  <a:endParaRPr lang="en-US" sz="2400" b="1" dirty="0">
-                    <a:ln w="0"/>
-                    <a:solidFill>
-                      <a:schemeClr val="bg1"/>
-                    </a:solidFill>
-                    <a:effectLst>
-                      <a:outerShdw blurRad="38100" dist="19050" dir="2700000" algn="tl" rotWithShape="0">
-                        <a:schemeClr val="dk1">
-                          <a:alpha val="40000"/>
-                        </a:schemeClr>
-                      </a:outerShdw>
-                    </a:effectLst>
-                  </a:endParaRPr>
                 </a:p>
               </p:txBody>
             </p:sp>
@@ -5410,19 +5595,6 @@
                     </a:rPr>
                     <a:t>Manual detection = time-consuming &amp; error-prone.</a:t>
                   </a:r>
-                  <a:endParaRPr lang="en-US" sz="2400" b="1" dirty="0">
-                    <a:ln w="0"/>
-                    <a:solidFill>
-                      <a:schemeClr val="bg1"/>
-                    </a:solidFill>
-                    <a:effectLst>
-                      <a:outerShdw blurRad="38100" dist="19050" dir="2700000" algn="tl" rotWithShape="0">
-                        <a:schemeClr val="dk1">
-                          <a:alpha val="40000"/>
-                        </a:schemeClr>
-                      </a:outerShdw>
-                    </a:effectLst>
-                  </a:endParaRPr>
                 </a:p>
               </p:txBody>
             </p:sp>
@@ -5519,19 +5691,6 @@
                     </a:rPr>
                     <a:t>MRI = Primary diagnostic tool.</a:t>
                   </a:r>
-                  <a:endParaRPr lang="en-US" sz="2400" b="1" dirty="0">
-                    <a:ln w="0"/>
-                    <a:solidFill>
-                      <a:schemeClr val="bg1"/>
-                    </a:solidFill>
-                    <a:effectLst>
-                      <a:outerShdw blurRad="38100" dist="19050" dir="2700000" algn="tl" rotWithShape="0">
-                        <a:schemeClr val="dk1">
-                          <a:alpha val="40000"/>
-                        </a:schemeClr>
-                      </a:outerShdw>
-                    </a:effectLst>
-                  </a:endParaRPr>
                 </a:p>
               </p:txBody>
             </p:sp>
@@ -5628,19 +5787,6 @@
                     </a:rPr>
                     <a:t>Deep Learning can automate &amp; support doctors.</a:t>
                   </a:r>
-                  <a:endParaRPr lang="en-US" sz="2400" b="1" dirty="0">
-                    <a:ln w="0"/>
-                    <a:solidFill>
-                      <a:schemeClr val="bg1"/>
-                    </a:solidFill>
-                    <a:effectLst>
-                      <a:outerShdw blurRad="38100" dist="19050" dir="2700000" algn="tl" rotWithShape="0">
-                        <a:schemeClr val="dk1">
-                          <a:alpha val="40000"/>
-                        </a:schemeClr>
-                      </a:outerShdw>
-                    </a:effectLst>
-                  </a:endParaRPr>
                 </a:p>
               </p:txBody>
             </p:sp>
@@ -5798,19 +5944,6 @@
               </a:rPr>
               <a:t>Objectives</a:t>
             </a:r>
-            <a:endParaRPr lang="en-US" sz="3000" b="1" dirty="0">
-              <a:ln w="0"/>
-              <a:solidFill>
-                <a:schemeClr val="bg1"/>
-              </a:solidFill>
-              <a:effectLst>
-                <a:outerShdw blurRad="38100" dist="19050" dir="2700000" algn="tl" rotWithShape="0">
-                  <a:schemeClr val="dk1">
-                    <a:alpha val="40000"/>
-                  </a:schemeClr>
-                </a:outerShdw>
-              </a:effectLst>
-            </a:endParaRPr>
           </a:p>
         </p:txBody>
       </p:sp>
@@ -5984,19 +6117,6 @@
                 </a:rPr>
                 <a:t>Automate MRI image classification.</a:t>
               </a:r>
-              <a:endParaRPr lang="en-US" sz="2400" b="1" dirty="0">
-                <a:ln w="0"/>
-                <a:solidFill>
-                  <a:schemeClr val="bg1"/>
-                </a:solidFill>
-                <a:effectLst>
-                  <a:outerShdw blurRad="38100" dist="19050" dir="2700000" algn="tl" rotWithShape="0">
-                    <a:schemeClr val="dk1">
-                      <a:alpha val="40000"/>
-                    </a:schemeClr>
-                  </a:outerShdw>
-                </a:effectLst>
-              </a:endParaRPr>
             </a:p>
           </p:txBody>
         </p:sp>
@@ -6093,19 +6213,6 @@
                 </a:rPr>
                 <a:t>Detect if tumor is present.</a:t>
               </a:r>
-              <a:endParaRPr lang="en-US" sz="2400" b="1" dirty="0">
-                <a:ln w="0"/>
-                <a:solidFill>
-                  <a:schemeClr val="bg1"/>
-                </a:solidFill>
-                <a:effectLst>
-                  <a:outerShdw blurRad="38100" dist="19050" dir="2700000" algn="tl" rotWithShape="0">
-                    <a:schemeClr val="dk1">
-                      <a:alpha val="40000"/>
-                    </a:schemeClr>
-                  </a:outerShdw>
-                </a:effectLst>
-              </a:endParaRPr>
             </a:p>
           </p:txBody>
         </p:sp>
@@ -6202,19 +6309,6 @@
                 </a:rPr>
                 <a:t>Predict tumor type: Pituitary, Glioma, Meningioma.</a:t>
               </a:r>
-              <a:endParaRPr lang="en-US" sz="2400" b="1" dirty="0">
-                <a:ln w="0"/>
-                <a:solidFill>
-                  <a:schemeClr val="bg1"/>
-                </a:solidFill>
-                <a:effectLst>
-                  <a:outerShdw blurRad="38100" dist="19050" dir="2700000" algn="tl" rotWithShape="0">
-                    <a:schemeClr val="dk1">
-                      <a:alpha val="40000"/>
-                    </a:schemeClr>
-                  </a:outerShdw>
-                </a:effectLst>
-              </a:endParaRPr>
             </a:p>
           </p:txBody>
         </p:sp>
@@ -6311,19 +6405,6 @@
                 </a:rPr>
                 <a:t>Use Transfer Learning (VGG16).</a:t>
               </a:r>
-              <a:endParaRPr lang="en-US" sz="2400" b="1" dirty="0">
-                <a:ln w="0"/>
-                <a:solidFill>
-                  <a:schemeClr val="bg1"/>
-                </a:solidFill>
-                <a:effectLst>
-                  <a:outerShdw blurRad="38100" dist="19050" dir="2700000" algn="tl" rotWithShape="0">
-                    <a:schemeClr val="dk1">
-                      <a:alpha val="40000"/>
-                    </a:schemeClr>
-                  </a:outerShdw>
-                </a:effectLst>
-              </a:endParaRPr>
             </a:p>
           </p:txBody>
         </p:sp>
@@ -6454,19 +6535,6 @@
               </a:rPr>
               <a:t>Dataset Details</a:t>
             </a:r>
-            <a:endParaRPr lang="en-US" sz="3000" b="1" dirty="0">
-              <a:ln w="0"/>
-              <a:solidFill>
-                <a:schemeClr val="bg1"/>
-              </a:solidFill>
-              <a:effectLst>
-                <a:outerShdw blurRad="38100" dist="19050" dir="2700000" algn="tl" rotWithShape="0">
-                  <a:schemeClr val="dk1">
-                    <a:alpha val="40000"/>
-                  </a:schemeClr>
-                </a:outerShdw>
-              </a:effectLst>
-            </a:endParaRPr>
           </a:p>
         </p:txBody>
       </p:sp>
@@ -6640,19 +6708,6 @@
                 </a:rPr>
                 <a:t>Source: https://www.kaggle.com/datasets/masoudnickparvar/brain-tumor-mri-dataset </a:t>
               </a:r>
-              <a:endParaRPr lang="en-US" sz="2400" b="1" dirty="0">
-                <a:ln w="0"/>
-                <a:solidFill>
-                  <a:schemeClr val="bg1"/>
-                </a:solidFill>
-                <a:effectLst>
-                  <a:outerShdw blurRad="38100" dist="19050" dir="2700000" algn="tl" rotWithShape="0">
-                    <a:schemeClr val="dk1">
-                      <a:alpha val="40000"/>
-                    </a:schemeClr>
-                  </a:outerShdw>
-                </a:effectLst>
-              </a:endParaRPr>
             </a:p>
           </p:txBody>
         </p:sp>
@@ -6807,19 +6862,6 @@
               </a:rPr>
               <a:t>Model Architecture</a:t>
             </a:r>
-            <a:endParaRPr lang="en-US" sz="3000" b="1" dirty="0">
-              <a:ln w="0"/>
-              <a:solidFill>
-                <a:schemeClr val="bg1"/>
-              </a:solidFill>
-              <a:effectLst>
-                <a:outerShdw blurRad="38100" dist="19050" dir="2700000" algn="tl" rotWithShape="0">
-                  <a:schemeClr val="dk1">
-                    <a:alpha val="40000"/>
-                  </a:schemeClr>
-                </a:outerShdw>
-              </a:effectLst>
-            </a:endParaRPr>
           </a:p>
         </p:txBody>
       </p:sp>
@@ -6993,19 +7035,6 @@
                 </a:rPr>
                 <a:t>Pre-trained VGG16 (Transfer Learning)</a:t>
               </a:r>
-              <a:endParaRPr lang="en-US" sz="2400" b="1" dirty="0">
-                <a:ln w="0"/>
-                <a:solidFill>
-                  <a:schemeClr val="bg1"/>
-                </a:solidFill>
-                <a:effectLst>
-                  <a:outerShdw blurRad="38100" dist="19050" dir="2700000" algn="tl" rotWithShape="0">
-                    <a:schemeClr val="dk1">
-                      <a:alpha val="40000"/>
-                    </a:schemeClr>
-                  </a:outerShdw>
-                </a:effectLst>
-              </a:endParaRPr>
             </a:p>
           </p:txBody>
         </p:sp>
@@ -7600,19 +7629,6 @@
               </a:rPr>
               <a:t>Training Setup</a:t>
             </a:r>
-            <a:endParaRPr lang="en-US" sz="3000" b="1" dirty="0">
-              <a:ln w="0"/>
-              <a:solidFill>
-                <a:schemeClr val="bg1"/>
-              </a:solidFill>
-              <a:effectLst>
-                <a:outerShdw blurRad="38100" dist="19050" dir="2700000" algn="tl" rotWithShape="0">
-                  <a:schemeClr val="dk1">
-                    <a:alpha val="40000"/>
-                  </a:schemeClr>
-                </a:outerShdw>
-              </a:effectLst>
-            </a:endParaRPr>
           </a:p>
         </p:txBody>
       </p:sp>
@@ -7786,19 +7802,6 @@
                 </a:rPr>
                 <a:t>Optimizer: Adam</a:t>
               </a:r>
-              <a:endParaRPr lang="en-US" sz="2400" b="1" dirty="0">
-                <a:ln w="0"/>
-                <a:solidFill>
-                  <a:schemeClr val="bg1"/>
-                </a:solidFill>
-                <a:effectLst>
-                  <a:outerShdw blurRad="38100" dist="19050" dir="2700000" algn="tl" rotWithShape="0">
-                    <a:schemeClr val="dk1">
-                      <a:alpha val="40000"/>
-                    </a:schemeClr>
-                  </a:outerShdw>
-                </a:effectLst>
-              </a:endParaRPr>
             </a:p>
           </p:txBody>
         </p:sp>
@@ -8020,19 +8023,6 @@
                 </a:rPr>
                 <a:t>Batch Size: 20</a:t>
               </a:r>
-              <a:endParaRPr lang="en-US" sz="2400" b="1" dirty="0">
-                <a:ln w="0"/>
-                <a:solidFill>
-                  <a:schemeClr val="bg1"/>
-                </a:solidFill>
-                <a:effectLst>
-                  <a:outerShdw blurRad="38100" dist="19050" dir="2700000" algn="tl" rotWithShape="0">
-                    <a:schemeClr val="dk1">
-                      <a:alpha val="40000"/>
-                    </a:schemeClr>
-                  </a:outerShdw>
-                </a:effectLst>
-              </a:endParaRPr>
             </a:p>
           </p:txBody>
         </p:sp>
@@ -8129,19 +8119,6 @@
                 </a:rPr>
                 <a:t>Epochs: 5</a:t>
               </a:r>
-              <a:endParaRPr lang="en-US" sz="2400" b="1" dirty="0">
-                <a:ln w="0"/>
-                <a:solidFill>
-                  <a:schemeClr val="bg1"/>
-                </a:solidFill>
-                <a:effectLst>
-                  <a:outerShdw blurRad="38100" dist="19050" dir="2700000" algn="tl" rotWithShape="0">
-                    <a:schemeClr val="dk1">
-                      <a:alpha val="40000"/>
-                    </a:schemeClr>
-                  </a:outerShdw>
-                </a:effectLst>
-              </a:endParaRPr>
             </a:p>
           </p:txBody>
         </p:sp>
@@ -8238,19 +8215,6 @@
                 </a:rPr>
                 <a:t>Data Generator: Augmented images during training</a:t>
               </a:r>
-              <a:endParaRPr lang="en-US" sz="2400" b="1" dirty="0">
-                <a:ln w="0"/>
-                <a:solidFill>
-                  <a:schemeClr val="bg1"/>
-                </a:solidFill>
-                <a:effectLst>
-                  <a:outerShdw blurRad="38100" dist="19050" dir="2700000" algn="tl" rotWithShape="0">
-                    <a:schemeClr val="dk1">
-                      <a:alpha val="40000"/>
-                    </a:schemeClr>
-                  </a:outerShdw>
-                </a:effectLst>
-              </a:endParaRPr>
             </a:p>
           </p:txBody>
         </p:sp>
@@ -8381,19 +8345,6 @@
               </a:rPr>
               <a:t>Training Results</a:t>
             </a:r>
-            <a:endParaRPr lang="en-US" sz="3000" b="1" dirty="0">
-              <a:ln w="0"/>
-              <a:solidFill>
-                <a:schemeClr val="bg1"/>
-              </a:solidFill>
-              <a:effectLst>
-                <a:outerShdw blurRad="38100" dist="19050" dir="2700000" algn="tl" rotWithShape="0">
-                  <a:schemeClr val="dk1">
-                    <a:alpha val="40000"/>
-                  </a:schemeClr>
-                </a:outerShdw>
-              </a:effectLst>
-            </a:endParaRPr>
           </a:p>
         </p:txBody>
       </p:sp>
@@ -8567,19 +8518,6 @@
                 </a:rPr>
                 <a:t>Accuracy: ~97% on Train</a:t>
               </a:r>
-              <a:endParaRPr lang="en-US" sz="2400" b="1" dirty="0">
-                <a:ln w="0"/>
-                <a:solidFill>
-                  <a:schemeClr val="bg1"/>
-                </a:solidFill>
-                <a:effectLst>
-                  <a:outerShdw blurRad="38100" dist="19050" dir="2700000" algn="tl" rotWithShape="0">
-                    <a:schemeClr val="dk1">
-                      <a:alpha val="40000"/>
-                    </a:schemeClr>
-                  </a:outerShdw>
-                </a:effectLst>
-              </a:endParaRPr>
             </a:p>
           </p:txBody>
         </p:sp>
@@ -8740,19 +8678,6 @@
               </a:rPr>
               <a:t>Test Results</a:t>
             </a:r>
-            <a:endParaRPr lang="en-US" sz="3000" b="1" dirty="0">
-              <a:ln w="0"/>
-              <a:solidFill>
-                <a:schemeClr val="bg1"/>
-              </a:solidFill>
-              <a:effectLst>
-                <a:outerShdw blurRad="38100" dist="19050" dir="2700000" algn="tl" rotWithShape="0">
-                  <a:schemeClr val="dk1">
-                    <a:alpha val="40000"/>
-                  </a:schemeClr>
-                </a:outerShdw>
-              </a:effectLst>
-            </a:endParaRPr>
           </a:p>
         </p:txBody>
       </p:sp>
@@ -8926,19 +8851,6 @@
                 </a:rPr>
                 <a:t>Accuracy: ~95% on test</a:t>
               </a:r>
-              <a:endParaRPr lang="en-US" sz="2400" b="1" dirty="0">
-                <a:ln w="0"/>
-                <a:solidFill>
-                  <a:schemeClr val="bg1"/>
-                </a:solidFill>
-                <a:effectLst>
-                  <a:outerShdw blurRad="38100" dist="19050" dir="2700000" algn="tl" rotWithShape="0">
-                    <a:schemeClr val="dk1">
-                      <a:alpha val="40000"/>
-                    </a:schemeClr>
-                  </a:outerShdw>
-                </a:effectLst>
-              </a:endParaRPr>
             </a:p>
           </p:txBody>
         </p:sp>

</xml_diff>